<commit_message>
Avance fin de semana semana santa
</commit_message>
<xml_diff>
--- a/CIRCUITO AT8N.pptx
+++ b/CIRCUITO AT8N.pptx
@@ -6,6 +6,8 @@
   </p:sldMasterIdLst>
   <p:sldIdLst>
     <p:sldId id="256" r:id="rId2"/>
+    <p:sldId id="257" r:id="rId3"/>
+    <p:sldId id="258" r:id="rId4"/>
   </p:sldIdLst>
   <p:sldSz cx="12192000" cy="6858000"/>
   <p:notesSz cx="6858000" cy="9144000"/>
@@ -104,6 +106,11 @@
       </a:defRPr>
     </a:lvl9pPr>
   </p:defaultTextStyle>
+  <p:extLst>
+    <p:ext uri="{EFAFB233-063F-42B5-8137-9DF3F51BA10A}">
+      <p15:sldGuideLst xmlns:p15="http://schemas.microsoft.com/office/powerpoint/2012/main"/>
+    </p:ext>
+  </p:extLst>
 </p:presentation>
 </file>
 
@@ -149,7 +156,7 @@
           </a:lstStyle>
           <a:p>
             <a:r>
-              <a:rPr lang="es-ES" smtClean="0"/>
+              <a:rPr lang="es-ES"/>
               <a:t>Haga clic para modificar el estilo de título del patrón</a:t>
             </a:r>
             <a:endParaRPr lang="en-US"/>
@@ -214,7 +221,7 @@
           </a:lstStyle>
           <a:p>
             <a:r>
-              <a:rPr lang="es-ES" smtClean="0"/>
+              <a:rPr lang="es-ES"/>
               <a:t>Haga clic para editar el estilo de subtítulo del patrón</a:t>
             </a:r>
             <a:endParaRPr lang="en-US"/>
@@ -238,7 +245,7 @@
           <a:p>
             <a:fld id="{D1D1DD5E-1860-4FBD-A3C0-B9F45BFBD16B}" type="datetimeFigureOut">
               <a:rPr lang="en-US" smtClean="0"/>
-              <a:t>4/13/2022</a:t>
+              <a:t>4/17/2022</a:t>
             </a:fld>
             <a:endParaRPr lang="en-US"/>
           </a:p>
@@ -332,7 +339,7 @@
           <a:lstStyle/>
           <a:p>
             <a:r>
-              <a:rPr lang="es-ES" smtClean="0"/>
+              <a:rPr lang="es-ES"/>
               <a:t>Haga clic para modificar el estilo de título del patrón</a:t>
             </a:r>
             <a:endParaRPr lang="en-US"/>
@@ -356,35 +363,35 @@
           <a:p>
             <a:pPr lvl="0"/>
             <a:r>
-              <a:rPr lang="es-ES" smtClean="0"/>
+              <a:rPr lang="es-ES"/>
               <a:t>Editar el estilo de texto del patrón</a:t>
             </a:r>
           </a:p>
           <a:p>
             <a:pPr lvl="1"/>
             <a:r>
-              <a:rPr lang="es-ES" smtClean="0"/>
+              <a:rPr lang="es-ES"/>
               <a:t>Segundo nivel</a:t>
             </a:r>
           </a:p>
           <a:p>
             <a:pPr lvl="2"/>
             <a:r>
-              <a:rPr lang="es-ES" smtClean="0"/>
+              <a:rPr lang="es-ES"/>
               <a:t>Tercer nivel</a:t>
             </a:r>
           </a:p>
           <a:p>
             <a:pPr lvl="3"/>
             <a:r>
-              <a:rPr lang="es-ES" smtClean="0"/>
+              <a:rPr lang="es-ES"/>
               <a:t>Cuarto nivel</a:t>
             </a:r>
           </a:p>
           <a:p>
             <a:pPr lvl="4"/>
             <a:r>
-              <a:rPr lang="es-ES" smtClean="0"/>
+              <a:rPr lang="es-ES"/>
               <a:t>Quinto nivel</a:t>
             </a:r>
             <a:endParaRPr lang="en-US"/>
@@ -408,7 +415,7 @@
           <a:p>
             <a:fld id="{D1D1DD5E-1860-4FBD-A3C0-B9F45BFBD16B}" type="datetimeFigureOut">
               <a:rPr lang="en-US" smtClean="0"/>
-              <a:t>4/13/2022</a:t>
+              <a:t>4/17/2022</a:t>
             </a:fld>
             <a:endParaRPr lang="en-US"/>
           </a:p>
@@ -507,7 +514,7 @@
           <a:lstStyle/>
           <a:p>
             <a:r>
-              <a:rPr lang="es-ES" smtClean="0"/>
+              <a:rPr lang="es-ES"/>
               <a:t>Haga clic para modificar el estilo de título del patrón</a:t>
             </a:r>
             <a:endParaRPr lang="en-US"/>
@@ -536,35 +543,35 @@
           <a:p>
             <a:pPr lvl="0"/>
             <a:r>
-              <a:rPr lang="es-ES" smtClean="0"/>
+              <a:rPr lang="es-ES"/>
               <a:t>Editar el estilo de texto del patrón</a:t>
             </a:r>
           </a:p>
           <a:p>
             <a:pPr lvl="1"/>
             <a:r>
-              <a:rPr lang="es-ES" smtClean="0"/>
+              <a:rPr lang="es-ES"/>
               <a:t>Segundo nivel</a:t>
             </a:r>
           </a:p>
           <a:p>
             <a:pPr lvl="2"/>
             <a:r>
-              <a:rPr lang="es-ES" smtClean="0"/>
+              <a:rPr lang="es-ES"/>
               <a:t>Tercer nivel</a:t>
             </a:r>
           </a:p>
           <a:p>
             <a:pPr lvl="3"/>
             <a:r>
-              <a:rPr lang="es-ES" smtClean="0"/>
+              <a:rPr lang="es-ES"/>
               <a:t>Cuarto nivel</a:t>
             </a:r>
           </a:p>
           <a:p>
             <a:pPr lvl="4"/>
             <a:r>
-              <a:rPr lang="es-ES" smtClean="0"/>
+              <a:rPr lang="es-ES"/>
               <a:t>Quinto nivel</a:t>
             </a:r>
             <a:endParaRPr lang="en-US"/>
@@ -588,7 +595,7 @@
           <a:p>
             <a:fld id="{D1D1DD5E-1860-4FBD-A3C0-B9F45BFBD16B}" type="datetimeFigureOut">
               <a:rPr lang="en-US" smtClean="0"/>
-              <a:t>4/13/2022</a:t>
+              <a:t>4/17/2022</a:t>
             </a:fld>
             <a:endParaRPr lang="en-US"/>
           </a:p>
@@ -682,7 +689,7 @@
           <a:lstStyle/>
           <a:p>
             <a:r>
-              <a:rPr lang="es-ES" smtClean="0"/>
+              <a:rPr lang="es-ES"/>
               <a:t>Haga clic para modificar el estilo de título del patrón</a:t>
             </a:r>
             <a:endParaRPr lang="en-US"/>
@@ -706,35 +713,35 @@
           <a:p>
             <a:pPr lvl="0"/>
             <a:r>
-              <a:rPr lang="es-ES" smtClean="0"/>
+              <a:rPr lang="es-ES"/>
               <a:t>Editar el estilo de texto del patrón</a:t>
             </a:r>
           </a:p>
           <a:p>
             <a:pPr lvl="1"/>
             <a:r>
-              <a:rPr lang="es-ES" smtClean="0"/>
+              <a:rPr lang="es-ES"/>
               <a:t>Segundo nivel</a:t>
             </a:r>
           </a:p>
           <a:p>
             <a:pPr lvl="2"/>
             <a:r>
-              <a:rPr lang="es-ES" smtClean="0"/>
+              <a:rPr lang="es-ES"/>
               <a:t>Tercer nivel</a:t>
             </a:r>
           </a:p>
           <a:p>
             <a:pPr lvl="3"/>
             <a:r>
-              <a:rPr lang="es-ES" smtClean="0"/>
+              <a:rPr lang="es-ES"/>
               <a:t>Cuarto nivel</a:t>
             </a:r>
           </a:p>
           <a:p>
             <a:pPr lvl="4"/>
             <a:r>
-              <a:rPr lang="es-ES" smtClean="0"/>
+              <a:rPr lang="es-ES"/>
               <a:t>Quinto nivel</a:t>
             </a:r>
             <a:endParaRPr lang="en-US"/>
@@ -758,7 +765,7 @@
           <a:p>
             <a:fld id="{D1D1DD5E-1860-4FBD-A3C0-B9F45BFBD16B}" type="datetimeFigureOut">
               <a:rPr lang="en-US" smtClean="0"/>
-              <a:t>4/13/2022</a:t>
+              <a:t>4/17/2022</a:t>
             </a:fld>
             <a:endParaRPr lang="en-US"/>
           </a:p>
@@ -861,7 +868,7 @@
           </a:lstStyle>
           <a:p>
             <a:r>
-              <a:rPr lang="es-ES" smtClean="0"/>
+              <a:rPr lang="es-ES"/>
               <a:t>Haga clic para modificar el estilo de título del patrón</a:t>
             </a:r>
             <a:endParaRPr lang="en-US"/>
@@ -981,7 +988,7 @@
           <a:p>
             <a:pPr lvl="0"/>
             <a:r>
-              <a:rPr lang="es-ES" smtClean="0"/>
+              <a:rPr lang="es-ES"/>
               <a:t>Editar el estilo de texto del patrón</a:t>
             </a:r>
           </a:p>
@@ -1004,7 +1011,7 @@
           <a:p>
             <a:fld id="{D1D1DD5E-1860-4FBD-A3C0-B9F45BFBD16B}" type="datetimeFigureOut">
               <a:rPr lang="en-US" smtClean="0"/>
-              <a:t>4/13/2022</a:t>
+              <a:t>4/17/2022</a:t>
             </a:fld>
             <a:endParaRPr lang="en-US"/>
           </a:p>
@@ -1098,7 +1105,7 @@
           <a:lstStyle/>
           <a:p>
             <a:r>
-              <a:rPr lang="es-ES" smtClean="0"/>
+              <a:rPr lang="es-ES"/>
               <a:t>Haga clic para modificar el estilo de título del patrón</a:t>
             </a:r>
             <a:endParaRPr lang="en-US"/>
@@ -1127,35 +1134,35 @@
           <a:p>
             <a:pPr lvl="0"/>
             <a:r>
-              <a:rPr lang="es-ES" smtClean="0"/>
+              <a:rPr lang="es-ES"/>
               <a:t>Editar el estilo de texto del patrón</a:t>
             </a:r>
           </a:p>
           <a:p>
             <a:pPr lvl="1"/>
             <a:r>
-              <a:rPr lang="es-ES" smtClean="0"/>
+              <a:rPr lang="es-ES"/>
               <a:t>Segundo nivel</a:t>
             </a:r>
           </a:p>
           <a:p>
             <a:pPr lvl="2"/>
             <a:r>
-              <a:rPr lang="es-ES" smtClean="0"/>
+              <a:rPr lang="es-ES"/>
               <a:t>Tercer nivel</a:t>
             </a:r>
           </a:p>
           <a:p>
             <a:pPr lvl="3"/>
             <a:r>
-              <a:rPr lang="es-ES" smtClean="0"/>
+              <a:rPr lang="es-ES"/>
               <a:t>Cuarto nivel</a:t>
             </a:r>
           </a:p>
           <a:p>
             <a:pPr lvl="4"/>
             <a:r>
-              <a:rPr lang="es-ES" smtClean="0"/>
+              <a:rPr lang="es-ES"/>
               <a:t>Quinto nivel</a:t>
             </a:r>
             <a:endParaRPr lang="en-US"/>
@@ -1184,35 +1191,35 @@
           <a:p>
             <a:pPr lvl="0"/>
             <a:r>
-              <a:rPr lang="es-ES" smtClean="0"/>
+              <a:rPr lang="es-ES"/>
               <a:t>Editar el estilo de texto del patrón</a:t>
             </a:r>
           </a:p>
           <a:p>
             <a:pPr lvl="1"/>
             <a:r>
-              <a:rPr lang="es-ES" smtClean="0"/>
+              <a:rPr lang="es-ES"/>
               <a:t>Segundo nivel</a:t>
             </a:r>
           </a:p>
           <a:p>
             <a:pPr lvl="2"/>
             <a:r>
-              <a:rPr lang="es-ES" smtClean="0"/>
+              <a:rPr lang="es-ES"/>
               <a:t>Tercer nivel</a:t>
             </a:r>
           </a:p>
           <a:p>
             <a:pPr lvl="3"/>
             <a:r>
-              <a:rPr lang="es-ES" smtClean="0"/>
+              <a:rPr lang="es-ES"/>
               <a:t>Cuarto nivel</a:t>
             </a:r>
           </a:p>
           <a:p>
             <a:pPr lvl="4"/>
             <a:r>
-              <a:rPr lang="es-ES" smtClean="0"/>
+              <a:rPr lang="es-ES"/>
               <a:t>Quinto nivel</a:t>
             </a:r>
             <a:endParaRPr lang="en-US"/>
@@ -1236,7 +1243,7 @@
           <a:p>
             <a:fld id="{D1D1DD5E-1860-4FBD-A3C0-B9F45BFBD16B}" type="datetimeFigureOut">
               <a:rPr lang="en-US" smtClean="0"/>
-              <a:t>4/13/2022</a:t>
+              <a:t>4/17/2022</a:t>
             </a:fld>
             <a:endParaRPr lang="en-US"/>
           </a:p>
@@ -1335,7 +1342,7 @@
           <a:lstStyle/>
           <a:p>
             <a:r>
-              <a:rPr lang="es-ES" smtClean="0"/>
+              <a:rPr lang="es-ES"/>
               <a:t>Haga clic para modificar el estilo de título del patrón</a:t>
             </a:r>
             <a:endParaRPr lang="en-US"/>
@@ -1401,7 +1408,7 @@
           <a:p>
             <a:pPr lvl="0"/>
             <a:r>
-              <a:rPr lang="es-ES" smtClean="0"/>
+              <a:rPr lang="es-ES"/>
               <a:t>Editar el estilo de texto del patrón</a:t>
             </a:r>
           </a:p>
@@ -1429,35 +1436,35 @@
           <a:p>
             <a:pPr lvl="0"/>
             <a:r>
-              <a:rPr lang="es-ES" smtClean="0"/>
+              <a:rPr lang="es-ES"/>
               <a:t>Editar el estilo de texto del patrón</a:t>
             </a:r>
           </a:p>
           <a:p>
             <a:pPr lvl="1"/>
             <a:r>
-              <a:rPr lang="es-ES" smtClean="0"/>
+              <a:rPr lang="es-ES"/>
               <a:t>Segundo nivel</a:t>
             </a:r>
           </a:p>
           <a:p>
             <a:pPr lvl="2"/>
             <a:r>
-              <a:rPr lang="es-ES" smtClean="0"/>
+              <a:rPr lang="es-ES"/>
               <a:t>Tercer nivel</a:t>
             </a:r>
           </a:p>
           <a:p>
             <a:pPr lvl="3"/>
             <a:r>
-              <a:rPr lang="es-ES" smtClean="0"/>
+              <a:rPr lang="es-ES"/>
               <a:t>Cuarto nivel</a:t>
             </a:r>
           </a:p>
           <a:p>
             <a:pPr lvl="4"/>
             <a:r>
-              <a:rPr lang="es-ES" smtClean="0"/>
+              <a:rPr lang="es-ES"/>
               <a:t>Quinto nivel</a:t>
             </a:r>
             <a:endParaRPr lang="en-US"/>
@@ -1523,7 +1530,7 @@
           <a:p>
             <a:pPr lvl="0"/>
             <a:r>
-              <a:rPr lang="es-ES" smtClean="0"/>
+              <a:rPr lang="es-ES"/>
               <a:t>Editar el estilo de texto del patrón</a:t>
             </a:r>
           </a:p>
@@ -1551,35 +1558,35 @@
           <a:p>
             <a:pPr lvl="0"/>
             <a:r>
-              <a:rPr lang="es-ES" smtClean="0"/>
+              <a:rPr lang="es-ES"/>
               <a:t>Editar el estilo de texto del patrón</a:t>
             </a:r>
           </a:p>
           <a:p>
             <a:pPr lvl="1"/>
             <a:r>
-              <a:rPr lang="es-ES" smtClean="0"/>
+              <a:rPr lang="es-ES"/>
               <a:t>Segundo nivel</a:t>
             </a:r>
           </a:p>
           <a:p>
             <a:pPr lvl="2"/>
             <a:r>
-              <a:rPr lang="es-ES" smtClean="0"/>
+              <a:rPr lang="es-ES"/>
               <a:t>Tercer nivel</a:t>
             </a:r>
           </a:p>
           <a:p>
             <a:pPr lvl="3"/>
             <a:r>
-              <a:rPr lang="es-ES" smtClean="0"/>
+              <a:rPr lang="es-ES"/>
               <a:t>Cuarto nivel</a:t>
             </a:r>
           </a:p>
           <a:p>
             <a:pPr lvl="4"/>
             <a:r>
-              <a:rPr lang="es-ES" smtClean="0"/>
+              <a:rPr lang="es-ES"/>
               <a:t>Quinto nivel</a:t>
             </a:r>
             <a:endParaRPr lang="en-US"/>
@@ -1603,7 +1610,7 @@
           <a:p>
             <a:fld id="{D1D1DD5E-1860-4FBD-A3C0-B9F45BFBD16B}" type="datetimeFigureOut">
               <a:rPr lang="en-US" smtClean="0"/>
-              <a:t>4/13/2022</a:t>
+              <a:t>4/17/2022</a:t>
             </a:fld>
             <a:endParaRPr lang="en-US"/>
           </a:p>
@@ -1697,7 +1704,7 @@
           <a:lstStyle/>
           <a:p>
             <a:r>
-              <a:rPr lang="es-ES" smtClean="0"/>
+              <a:rPr lang="es-ES"/>
               <a:t>Haga clic para modificar el estilo de título del patrón</a:t>
             </a:r>
             <a:endParaRPr lang="en-US"/>
@@ -1721,7 +1728,7 @@
           <a:p>
             <a:fld id="{D1D1DD5E-1860-4FBD-A3C0-B9F45BFBD16B}" type="datetimeFigureOut">
               <a:rPr lang="en-US" smtClean="0"/>
-              <a:t>4/13/2022</a:t>
+              <a:t>4/17/2022</a:t>
             </a:fld>
             <a:endParaRPr lang="en-US"/>
           </a:p>
@@ -1816,7 +1823,7 @@
           <a:p>
             <a:fld id="{D1D1DD5E-1860-4FBD-A3C0-B9F45BFBD16B}" type="datetimeFigureOut">
               <a:rPr lang="en-US" smtClean="0"/>
-              <a:t>4/13/2022</a:t>
+              <a:t>4/17/2022</a:t>
             </a:fld>
             <a:endParaRPr lang="en-US"/>
           </a:p>
@@ -1919,7 +1926,7 @@
           </a:lstStyle>
           <a:p>
             <a:r>
-              <a:rPr lang="es-ES" smtClean="0"/>
+              <a:rPr lang="es-ES"/>
               <a:t>Haga clic para modificar el estilo de título del patrón</a:t>
             </a:r>
             <a:endParaRPr lang="en-US"/>
@@ -1976,35 +1983,35 @@
           <a:p>
             <a:pPr lvl="0"/>
             <a:r>
-              <a:rPr lang="es-ES" smtClean="0"/>
+              <a:rPr lang="es-ES"/>
               <a:t>Editar el estilo de texto del patrón</a:t>
             </a:r>
           </a:p>
           <a:p>
             <a:pPr lvl="1"/>
             <a:r>
-              <a:rPr lang="es-ES" smtClean="0"/>
+              <a:rPr lang="es-ES"/>
               <a:t>Segundo nivel</a:t>
             </a:r>
           </a:p>
           <a:p>
             <a:pPr lvl="2"/>
             <a:r>
-              <a:rPr lang="es-ES" smtClean="0"/>
+              <a:rPr lang="es-ES"/>
               <a:t>Tercer nivel</a:t>
             </a:r>
           </a:p>
           <a:p>
             <a:pPr lvl="3"/>
             <a:r>
-              <a:rPr lang="es-ES" smtClean="0"/>
+              <a:rPr lang="es-ES"/>
               <a:t>Cuarto nivel</a:t>
             </a:r>
           </a:p>
           <a:p>
             <a:pPr lvl="4"/>
             <a:r>
-              <a:rPr lang="es-ES" smtClean="0"/>
+              <a:rPr lang="es-ES"/>
               <a:t>Quinto nivel</a:t>
             </a:r>
             <a:endParaRPr lang="en-US"/>
@@ -2070,7 +2077,7 @@
           <a:p>
             <a:pPr lvl="0"/>
             <a:r>
-              <a:rPr lang="es-ES" smtClean="0"/>
+              <a:rPr lang="es-ES"/>
               <a:t>Editar el estilo de texto del patrón</a:t>
             </a:r>
           </a:p>
@@ -2093,7 +2100,7 @@
           <a:p>
             <a:fld id="{D1D1DD5E-1860-4FBD-A3C0-B9F45BFBD16B}" type="datetimeFigureOut">
               <a:rPr lang="en-US" smtClean="0"/>
-              <a:t>4/13/2022</a:t>
+              <a:t>4/17/2022</a:t>
             </a:fld>
             <a:endParaRPr lang="en-US"/>
           </a:p>
@@ -2196,7 +2203,7 @@
           </a:lstStyle>
           <a:p>
             <a:r>
-              <a:rPr lang="es-ES" smtClean="0"/>
+              <a:rPr lang="es-ES"/>
               <a:t>Haga clic para modificar el estilo de título del patrón</a:t>
             </a:r>
             <a:endParaRPr lang="en-US"/>
@@ -2323,7 +2330,7 @@
           <a:p>
             <a:pPr lvl="0"/>
             <a:r>
-              <a:rPr lang="es-ES" smtClean="0"/>
+              <a:rPr lang="es-ES"/>
               <a:t>Editar el estilo de texto del patrón</a:t>
             </a:r>
           </a:p>
@@ -2346,7 +2353,7 @@
           <a:p>
             <a:fld id="{D1D1DD5E-1860-4FBD-A3C0-B9F45BFBD16B}" type="datetimeFigureOut">
               <a:rPr lang="en-US" smtClean="0"/>
-              <a:t>4/13/2022</a:t>
+              <a:t>4/17/2022</a:t>
             </a:fld>
             <a:endParaRPr lang="en-US"/>
           </a:p>
@@ -2455,7 +2462,7 @@
           <a:lstStyle/>
           <a:p>
             <a:r>
-              <a:rPr lang="es-ES" smtClean="0"/>
+              <a:rPr lang="es-ES"/>
               <a:t>Haga clic para modificar el estilo de título del patrón</a:t>
             </a:r>
             <a:endParaRPr lang="en-US"/>
@@ -2489,35 +2496,35 @@
           <a:p>
             <a:pPr lvl="0"/>
             <a:r>
-              <a:rPr lang="es-ES" smtClean="0"/>
+              <a:rPr lang="es-ES"/>
               <a:t>Editar el estilo de texto del patrón</a:t>
             </a:r>
           </a:p>
           <a:p>
             <a:pPr lvl="1"/>
             <a:r>
-              <a:rPr lang="es-ES" smtClean="0"/>
+              <a:rPr lang="es-ES"/>
               <a:t>Segundo nivel</a:t>
             </a:r>
           </a:p>
           <a:p>
             <a:pPr lvl="2"/>
             <a:r>
-              <a:rPr lang="es-ES" smtClean="0"/>
+              <a:rPr lang="es-ES"/>
               <a:t>Tercer nivel</a:t>
             </a:r>
           </a:p>
           <a:p>
             <a:pPr lvl="3"/>
             <a:r>
-              <a:rPr lang="es-ES" smtClean="0"/>
+              <a:rPr lang="es-ES"/>
               <a:t>Cuarto nivel</a:t>
             </a:r>
           </a:p>
           <a:p>
             <a:pPr lvl="4"/>
             <a:r>
-              <a:rPr lang="es-ES" smtClean="0"/>
+              <a:rPr lang="es-ES"/>
               <a:t>Quinto nivel</a:t>
             </a:r>
             <a:endParaRPr lang="en-US"/>
@@ -2559,7 +2566,7 @@
           <a:p>
             <a:fld id="{D1D1DD5E-1860-4FBD-A3C0-B9F45BFBD16B}" type="datetimeFigureOut">
               <a:rPr lang="en-US" smtClean="0"/>
-              <a:t>4/13/2022</a:t>
+              <a:t>4/17/2022</a:t>
             </a:fld>
             <a:endParaRPr lang="en-US"/>
           </a:p>
@@ -3013,7 +3020,7 @@
             <a:lstStyle/>
             <a:p>
               <a:r>
-                <a:rPr lang="es-ES" sz="6000" dirty="0" smtClean="0">
+                <a:rPr lang="es-ES" sz="6000" dirty="0">
                   <a:latin typeface="Century Gothic" panose="020B0502020202020204" pitchFamily="34" charset="0"/>
                 </a:rPr>
                 <a:t>4</a:t>
@@ -3697,7 +3704,7 @@
               <a:lstStyle/>
               <a:p>
                 <a:r>
-                  <a:rPr lang="es-ES" sz="3200" b="1" dirty="0" smtClean="0">
+                  <a:rPr lang="es-ES" sz="3200" b="1" dirty="0">
                     <a:latin typeface="Century Gothic" panose="020B0502020202020204" pitchFamily="34" charset="0"/>
                   </a:rPr>
                   <a:t>NO</a:t>
@@ -3731,7 +3738,7 @@
               <a:lstStyle/>
               <a:p>
                 <a:r>
-                  <a:rPr lang="es-ES" sz="3200" b="1" dirty="0" smtClean="0">
+                  <a:rPr lang="es-ES" sz="3200" b="1" dirty="0">
                     <a:latin typeface="Century Gothic" panose="020B0502020202020204" pitchFamily="34" charset="0"/>
                   </a:rPr>
                   <a:t>NC</a:t>
@@ -4094,7 +4101,7 @@
               <a:lstStyle/>
               <a:p>
                 <a:r>
-                  <a:rPr lang="es-ES" sz="3200" b="1" dirty="0" smtClean="0">
+                  <a:rPr lang="es-ES" sz="3200" b="1" dirty="0">
                     <a:latin typeface="Century Gothic" panose="020B0502020202020204" pitchFamily="34" charset="0"/>
                   </a:rPr>
                   <a:t>NO</a:t>
@@ -4128,7 +4135,7 @@
               <a:lstStyle/>
               <a:p>
                 <a:r>
-                  <a:rPr lang="es-ES" sz="3200" b="1" dirty="0" smtClean="0">
+                  <a:rPr lang="es-ES" sz="3200" b="1" dirty="0">
                     <a:latin typeface="Century Gothic" panose="020B0502020202020204" pitchFamily="34" charset="0"/>
                   </a:rPr>
                   <a:t>NC</a:t>
@@ -4274,7 +4281,7 @@
             <a:p>
               <a:pPr algn="ctr"/>
               <a:r>
-                <a:rPr lang="es-ES" sz="4000" b="1" dirty="0" smtClean="0">
+                <a:rPr lang="es-ES" sz="4000" b="1" dirty="0">
                   <a:latin typeface="Century Gothic" panose="020B0502020202020204" pitchFamily="34" charset="0"/>
                 </a:rPr>
                 <a:t>SOURCE</a:t>
@@ -4420,6 +4427,146 @@
     <p:extLst>
       <p:ext uri="{BB962C8B-B14F-4D97-AF65-F5344CB8AC3E}">
         <p14:creationId xmlns:p14="http://schemas.microsoft.com/office/powerpoint/2010/main" val="1984180097"/>
+      </p:ext>
+    </p:extLst>
+  </p:cSld>
+  <p:clrMapOvr>
+    <a:masterClrMapping/>
+  </p:clrMapOvr>
+</p:sld>
+</file>
+
+<file path=ppt/slides/slide2.xml><?xml version="1.0" encoding="utf-8"?>
+<p:sld xmlns:a="http://schemas.openxmlformats.org/drawingml/2006/main" xmlns:r="http://schemas.openxmlformats.org/officeDocument/2006/relationships" xmlns:p="http://schemas.openxmlformats.org/presentationml/2006/main">
+  <p:cSld>
+    <p:spTree>
+      <p:nvGrpSpPr>
+        <p:cNvPr id="1" name=""/>
+        <p:cNvGrpSpPr/>
+        <p:nvPr/>
+      </p:nvGrpSpPr>
+      <p:grpSpPr>
+        <a:xfrm>
+          <a:off x="0" y="0"/>
+          <a:ext cx="0" cy="0"/>
+          <a:chOff x="0" y="0"/>
+          <a:chExt cx="0" cy="0"/>
+        </a:xfrm>
+      </p:grpSpPr>
+      <p:pic>
+        <p:nvPicPr>
+          <p:cNvPr id="4" name="Imagen 3">
+            <a:extLst>
+              <a:ext uri="{FF2B5EF4-FFF2-40B4-BE49-F238E27FC236}">
+                <a16:creationId xmlns:a16="http://schemas.microsoft.com/office/drawing/2014/main" id="{3C16843A-6011-4F30-AB29-86CC66D7A9AD}"/>
+              </a:ext>
+            </a:extLst>
+          </p:cNvPr>
+          <p:cNvPicPr>
+            <a:picLocks noChangeAspect="1"/>
+          </p:cNvPicPr>
+          <p:nvPr/>
+        </p:nvPicPr>
+        <p:blipFill>
+          <a:blip r:embed="rId2"/>
+          <a:stretch>
+            <a:fillRect/>
+          </a:stretch>
+        </p:blipFill>
+        <p:spPr>
+          <a:xfrm>
+            <a:off x="2321378" y="687161"/>
+            <a:ext cx="8651792" cy="4741182"/>
+          </a:xfrm>
+          <a:prstGeom prst="rect">
+            <a:avLst/>
+          </a:prstGeom>
+        </p:spPr>
+      </p:pic>
+    </p:spTree>
+    <p:extLst>
+      <p:ext uri="{BB962C8B-B14F-4D97-AF65-F5344CB8AC3E}">
+        <p14:creationId xmlns:p14="http://schemas.microsoft.com/office/powerpoint/2010/main" val="2779042575"/>
+      </p:ext>
+    </p:extLst>
+  </p:cSld>
+  <p:clrMapOvr>
+    <a:masterClrMapping/>
+  </p:clrMapOvr>
+</p:sld>
+</file>
+
+<file path=ppt/slides/slide3.xml><?xml version="1.0" encoding="utf-8"?>
+<p:sld xmlns:a="http://schemas.openxmlformats.org/drawingml/2006/main" xmlns:r="http://schemas.openxmlformats.org/officeDocument/2006/relationships" xmlns:p="http://schemas.openxmlformats.org/presentationml/2006/main">
+  <p:cSld>
+    <p:spTree>
+      <p:nvGrpSpPr>
+        <p:cNvPr id="1" name=""/>
+        <p:cNvGrpSpPr/>
+        <p:nvPr/>
+      </p:nvGrpSpPr>
+      <p:grpSpPr>
+        <a:xfrm>
+          <a:off x="0" y="0"/>
+          <a:ext cx="0" cy="0"/>
+          <a:chOff x="0" y="0"/>
+          <a:chExt cx="0" cy="0"/>
+        </a:xfrm>
+      </p:grpSpPr>
+      <p:sp>
+        <p:nvSpPr>
+          <p:cNvPr id="2" name="Título 1">
+            <a:extLst>
+              <a:ext uri="{FF2B5EF4-FFF2-40B4-BE49-F238E27FC236}">
+                <a16:creationId xmlns:a16="http://schemas.microsoft.com/office/drawing/2014/main" id="{5806BE05-91DD-4992-B3B1-EE50145963FD}"/>
+              </a:ext>
+            </a:extLst>
+          </p:cNvPr>
+          <p:cNvSpPr>
+            <a:spLocks noGrp="1"/>
+          </p:cNvSpPr>
+          <p:nvPr>
+            <p:ph type="title"/>
+          </p:nvPr>
+        </p:nvSpPr>
+        <p:spPr/>
+        <p:txBody>
+          <a:bodyPr/>
+          <a:lstStyle/>
+          <a:p>
+            <a:endParaRPr lang="es-MX"/>
+          </a:p>
+        </p:txBody>
+      </p:sp>
+      <p:sp>
+        <p:nvSpPr>
+          <p:cNvPr id="3" name="Marcador de contenido 2">
+            <a:extLst>
+              <a:ext uri="{FF2B5EF4-FFF2-40B4-BE49-F238E27FC236}">
+                <a16:creationId xmlns:a16="http://schemas.microsoft.com/office/drawing/2014/main" id="{736C9DEE-28AD-47A5-B0B4-AB4CA630C8DD}"/>
+              </a:ext>
+            </a:extLst>
+          </p:cNvPr>
+          <p:cNvSpPr>
+            <a:spLocks noGrp="1"/>
+          </p:cNvSpPr>
+          <p:nvPr>
+            <p:ph idx="1"/>
+          </p:nvPr>
+        </p:nvSpPr>
+        <p:spPr/>
+        <p:txBody>
+          <a:bodyPr/>
+          <a:lstStyle/>
+          <a:p>
+            <a:endParaRPr lang="es-MX"/>
+          </a:p>
+        </p:txBody>
+      </p:sp>
+    </p:spTree>
+    <p:extLst>
+      <p:ext uri="{BB962C8B-B14F-4D97-AF65-F5344CB8AC3E}">
+        <p14:creationId xmlns:p14="http://schemas.microsoft.com/office/powerpoint/2010/main" val="885687479"/>
       </p:ext>
     </p:extLst>
   </p:cSld>

</xml_diff>

<commit_message>
Avance 19 04 2022
</commit_message>
<xml_diff>
--- a/CIRCUITO AT8N.pptx
+++ b/CIRCUITO AT8N.pptx
@@ -245,7 +245,7 @@
           <a:p>
             <a:fld id="{D1D1DD5E-1860-4FBD-A3C0-B9F45BFBD16B}" type="datetimeFigureOut">
               <a:rPr lang="en-US" smtClean="0"/>
-              <a:t>4/17/2022</a:t>
+              <a:t>4/18/2022</a:t>
             </a:fld>
             <a:endParaRPr lang="en-US"/>
           </a:p>
@@ -415,7 +415,7 @@
           <a:p>
             <a:fld id="{D1D1DD5E-1860-4FBD-A3C0-B9F45BFBD16B}" type="datetimeFigureOut">
               <a:rPr lang="en-US" smtClean="0"/>
-              <a:t>4/17/2022</a:t>
+              <a:t>4/18/2022</a:t>
             </a:fld>
             <a:endParaRPr lang="en-US"/>
           </a:p>
@@ -595,7 +595,7 @@
           <a:p>
             <a:fld id="{D1D1DD5E-1860-4FBD-A3C0-B9F45BFBD16B}" type="datetimeFigureOut">
               <a:rPr lang="en-US" smtClean="0"/>
-              <a:t>4/17/2022</a:t>
+              <a:t>4/18/2022</a:t>
             </a:fld>
             <a:endParaRPr lang="en-US"/>
           </a:p>
@@ -765,7 +765,7 @@
           <a:p>
             <a:fld id="{D1D1DD5E-1860-4FBD-A3C0-B9F45BFBD16B}" type="datetimeFigureOut">
               <a:rPr lang="en-US" smtClean="0"/>
-              <a:t>4/17/2022</a:t>
+              <a:t>4/18/2022</a:t>
             </a:fld>
             <a:endParaRPr lang="en-US"/>
           </a:p>
@@ -1011,7 +1011,7 @@
           <a:p>
             <a:fld id="{D1D1DD5E-1860-4FBD-A3C0-B9F45BFBD16B}" type="datetimeFigureOut">
               <a:rPr lang="en-US" smtClean="0"/>
-              <a:t>4/17/2022</a:t>
+              <a:t>4/18/2022</a:t>
             </a:fld>
             <a:endParaRPr lang="en-US"/>
           </a:p>
@@ -1243,7 +1243,7 @@
           <a:p>
             <a:fld id="{D1D1DD5E-1860-4FBD-A3C0-B9F45BFBD16B}" type="datetimeFigureOut">
               <a:rPr lang="en-US" smtClean="0"/>
-              <a:t>4/17/2022</a:t>
+              <a:t>4/18/2022</a:t>
             </a:fld>
             <a:endParaRPr lang="en-US"/>
           </a:p>
@@ -1610,7 +1610,7 @@
           <a:p>
             <a:fld id="{D1D1DD5E-1860-4FBD-A3C0-B9F45BFBD16B}" type="datetimeFigureOut">
               <a:rPr lang="en-US" smtClean="0"/>
-              <a:t>4/17/2022</a:t>
+              <a:t>4/18/2022</a:t>
             </a:fld>
             <a:endParaRPr lang="en-US"/>
           </a:p>
@@ -1728,7 +1728,7 @@
           <a:p>
             <a:fld id="{D1D1DD5E-1860-4FBD-A3C0-B9F45BFBD16B}" type="datetimeFigureOut">
               <a:rPr lang="en-US" smtClean="0"/>
-              <a:t>4/17/2022</a:t>
+              <a:t>4/18/2022</a:t>
             </a:fld>
             <a:endParaRPr lang="en-US"/>
           </a:p>
@@ -1823,7 +1823,7 @@
           <a:p>
             <a:fld id="{D1D1DD5E-1860-4FBD-A3C0-B9F45BFBD16B}" type="datetimeFigureOut">
               <a:rPr lang="en-US" smtClean="0"/>
-              <a:t>4/17/2022</a:t>
+              <a:t>4/18/2022</a:t>
             </a:fld>
             <a:endParaRPr lang="en-US"/>
           </a:p>
@@ -2100,7 +2100,7 @@
           <a:p>
             <a:fld id="{D1D1DD5E-1860-4FBD-A3C0-B9F45BFBD16B}" type="datetimeFigureOut">
               <a:rPr lang="en-US" smtClean="0"/>
-              <a:t>4/17/2022</a:t>
+              <a:t>4/18/2022</a:t>
             </a:fld>
             <a:endParaRPr lang="en-US"/>
           </a:p>
@@ -2353,7 +2353,7 @@
           <a:p>
             <a:fld id="{D1D1DD5E-1860-4FBD-A3C0-B9F45BFBD16B}" type="datetimeFigureOut">
               <a:rPr lang="en-US" smtClean="0"/>
-              <a:t>4/17/2022</a:t>
+              <a:t>4/18/2022</a:t>
             </a:fld>
             <a:endParaRPr lang="en-US"/>
           </a:p>
@@ -2566,7 +2566,7 @@
           <a:p>
             <a:fld id="{D1D1DD5E-1860-4FBD-A3C0-B9F45BFBD16B}" type="datetimeFigureOut">
               <a:rPr lang="en-US" smtClean="0"/>
-              <a:t>4/17/2022</a:t>
+              <a:t>4/18/2022</a:t>
             </a:fld>
             <a:endParaRPr lang="en-US"/>
           </a:p>
@@ -4513,56 +4513,271 @@
           <a:chExt cx="0" cy="0"/>
         </a:xfrm>
       </p:grpSpPr>
-      <p:sp>
-        <p:nvSpPr>
-          <p:cNvPr id="2" name="Título 1">
-            <a:extLst>
-              <a:ext uri="{FF2B5EF4-FFF2-40B4-BE49-F238E27FC236}">
-                <a16:creationId xmlns:a16="http://schemas.microsoft.com/office/drawing/2014/main" id="{5806BE05-91DD-4992-B3B1-EE50145963FD}"/>
-              </a:ext>
-            </a:extLst>
-          </p:cNvPr>
-          <p:cNvSpPr>
-            <a:spLocks noGrp="1"/>
-          </p:cNvSpPr>
-          <p:nvPr>
-            <p:ph type="title"/>
-          </p:nvPr>
-        </p:nvSpPr>
-        <p:spPr/>
-        <p:txBody>
-          <a:bodyPr/>
-          <a:lstStyle/>
-          <a:p>
-            <a:endParaRPr lang="es-MX"/>
-          </a:p>
-        </p:txBody>
-      </p:sp>
-      <p:sp>
-        <p:nvSpPr>
-          <p:cNvPr id="3" name="Marcador de contenido 2">
-            <a:extLst>
-              <a:ext uri="{FF2B5EF4-FFF2-40B4-BE49-F238E27FC236}">
-                <a16:creationId xmlns:a16="http://schemas.microsoft.com/office/drawing/2014/main" id="{736C9DEE-28AD-47A5-B0B4-AB4CA630C8DD}"/>
-              </a:ext>
-            </a:extLst>
-          </p:cNvPr>
-          <p:cNvSpPr>
-            <a:spLocks noGrp="1"/>
-          </p:cNvSpPr>
-          <p:nvPr>
-            <p:ph idx="1"/>
-          </p:nvPr>
-        </p:nvSpPr>
-        <p:spPr/>
-        <p:txBody>
-          <a:bodyPr/>
-          <a:lstStyle/>
-          <a:p>
-            <a:endParaRPr lang="es-MX"/>
-          </a:p>
-        </p:txBody>
-      </p:sp>
+      <p:grpSp>
+        <p:nvGrpSpPr>
+          <p:cNvPr id="16" name="Grupo 15"/>
+          <p:cNvGrpSpPr/>
+          <p:nvPr/>
+        </p:nvGrpSpPr>
+        <p:grpSpPr>
+          <a:xfrm>
+            <a:off x="1531620" y="1577340"/>
+            <a:ext cx="9144000" cy="3566160"/>
+            <a:chOff x="1531620" y="1577340"/>
+            <a:chExt cx="9144000" cy="3566160"/>
+          </a:xfrm>
+        </p:grpSpPr>
+        <p:sp>
+          <p:nvSpPr>
+            <p:cNvPr id="4" name="Elipse 3"/>
+            <p:cNvSpPr/>
+            <p:nvPr/>
+          </p:nvSpPr>
+          <p:spPr>
+            <a:xfrm>
+              <a:off x="1531620" y="1577340"/>
+              <a:ext cx="3566160" cy="3566160"/>
+            </a:xfrm>
+            <a:prstGeom prst="ellipse">
+              <a:avLst/>
+            </a:prstGeom>
+            <a:noFill/>
+            <a:ln w="190500"/>
+          </p:spPr>
+          <p:style>
+            <a:lnRef idx="2">
+              <a:schemeClr val="dk1"/>
+            </a:lnRef>
+            <a:fillRef idx="1">
+              <a:schemeClr val="lt1"/>
+            </a:fillRef>
+            <a:effectRef idx="0">
+              <a:schemeClr val="dk1"/>
+            </a:effectRef>
+            <a:fontRef idx="minor">
+              <a:schemeClr val="dk1"/>
+            </a:fontRef>
+          </p:style>
+          <p:txBody>
+            <a:bodyPr rtlCol="0" anchor="ctr"/>
+            <a:lstStyle/>
+            <a:p>
+              <a:pPr algn="ctr"/>
+              <a:endParaRPr lang="en-US"/>
+            </a:p>
+          </p:txBody>
+        </p:sp>
+        <p:sp>
+          <p:nvSpPr>
+            <p:cNvPr id="5" name="Elipse 4"/>
+            <p:cNvSpPr/>
+            <p:nvPr/>
+          </p:nvSpPr>
+          <p:spPr>
+            <a:xfrm>
+              <a:off x="3512820" y="1577340"/>
+              <a:ext cx="3566160" cy="3566160"/>
+            </a:xfrm>
+            <a:prstGeom prst="ellipse">
+              <a:avLst/>
+            </a:prstGeom>
+            <a:noFill/>
+            <a:ln w="190500"/>
+          </p:spPr>
+          <p:style>
+            <a:lnRef idx="2">
+              <a:schemeClr val="dk1"/>
+            </a:lnRef>
+            <a:fillRef idx="1">
+              <a:schemeClr val="lt1"/>
+            </a:fillRef>
+            <a:effectRef idx="0">
+              <a:schemeClr val="dk1"/>
+            </a:effectRef>
+            <a:fontRef idx="minor">
+              <a:schemeClr val="dk1"/>
+            </a:fontRef>
+          </p:style>
+          <p:txBody>
+            <a:bodyPr rtlCol="0" anchor="ctr"/>
+            <a:lstStyle/>
+            <a:p>
+              <a:pPr algn="ctr"/>
+              <a:endParaRPr lang="en-US"/>
+            </a:p>
+          </p:txBody>
+        </p:sp>
+        <p:cxnSp>
+          <p:nvCxnSpPr>
+            <p:cNvPr id="9" name="Conector recto 8"/>
+            <p:cNvCxnSpPr/>
+            <p:nvPr/>
+          </p:nvCxnSpPr>
+          <p:spPr>
+            <a:xfrm>
+              <a:off x="6248400" y="1866900"/>
+              <a:ext cx="2209800" cy="0"/>
+            </a:xfrm>
+            <a:prstGeom prst="line">
+              <a:avLst/>
+            </a:prstGeom>
+            <a:ln w="190500"/>
+          </p:spPr>
+          <p:style>
+            <a:lnRef idx="1">
+              <a:schemeClr val="dk1"/>
+            </a:lnRef>
+            <a:fillRef idx="0">
+              <a:schemeClr val="dk1"/>
+            </a:fillRef>
+            <a:effectRef idx="0">
+              <a:schemeClr val="dk1"/>
+            </a:effectRef>
+            <a:fontRef idx="minor">
+              <a:schemeClr val="tx1"/>
+            </a:fontRef>
+          </p:style>
+        </p:cxnSp>
+        <p:cxnSp>
+          <p:nvCxnSpPr>
+            <p:cNvPr id="10" name="Conector recto 9"/>
+            <p:cNvCxnSpPr/>
+            <p:nvPr/>
+          </p:nvCxnSpPr>
+          <p:spPr>
+            <a:xfrm>
+              <a:off x="6286500" y="4876800"/>
+              <a:ext cx="2209800" cy="0"/>
+            </a:xfrm>
+            <a:prstGeom prst="line">
+              <a:avLst/>
+            </a:prstGeom>
+            <a:ln w="190500"/>
+          </p:spPr>
+          <p:style>
+            <a:lnRef idx="1">
+              <a:schemeClr val="dk1"/>
+            </a:lnRef>
+            <a:fillRef idx="0">
+              <a:schemeClr val="dk1"/>
+            </a:fillRef>
+            <a:effectRef idx="0">
+              <a:schemeClr val="dk1"/>
+            </a:effectRef>
+            <a:fontRef idx="minor">
+              <a:schemeClr val="tx1"/>
+            </a:fontRef>
+          </p:style>
+        </p:cxnSp>
+        <p:cxnSp>
+          <p:nvCxnSpPr>
+            <p:cNvPr id="12" name="Conector recto 11"/>
+            <p:cNvCxnSpPr/>
+            <p:nvPr/>
+          </p:nvCxnSpPr>
+          <p:spPr>
+            <a:xfrm>
+              <a:off x="8458200" y="1866900"/>
+              <a:ext cx="952500" cy="762000"/>
+            </a:xfrm>
+            <a:prstGeom prst="line">
+              <a:avLst/>
+            </a:prstGeom>
+            <a:ln w="190500"/>
+          </p:spPr>
+          <p:style>
+            <a:lnRef idx="1">
+              <a:schemeClr val="dk1"/>
+            </a:lnRef>
+            <a:fillRef idx="0">
+              <a:schemeClr val="dk1"/>
+            </a:fillRef>
+            <a:effectRef idx="0">
+              <a:schemeClr val="dk1"/>
+            </a:effectRef>
+            <a:fontRef idx="minor">
+              <a:schemeClr val="tx1"/>
+            </a:fontRef>
+          </p:style>
+        </p:cxnSp>
+        <p:cxnSp>
+          <p:nvCxnSpPr>
+            <p:cNvPr id="14" name="Conector recto 13"/>
+            <p:cNvCxnSpPr/>
+            <p:nvPr/>
+          </p:nvCxnSpPr>
+          <p:spPr>
+            <a:xfrm flipV="1">
+              <a:off x="8496300" y="4229100"/>
+              <a:ext cx="914400" cy="647700"/>
+            </a:xfrm>
+            <a:prstGeom prst="line">
+              <a:avLst/>
+            </a:prstGeom>
+            <a:ln w="190500"/>
+          </p:spPr>
+          <p:style>
+            <a:lnRef idx="1">
+              <a:schemeClr val="dk1"/>
+            </a:lnRef>
+            <a:fillRef idx="0">
+              <a:schemeClr val="dk1"/>
+            </a:fillRef>
+            <a:effectRef idx="0">
+              <a:schemeClr val="dk1"/>
+            </a:effectRef>
+            <a:fontRef idx="minor">
+              <a:schemeClr val="tx1"/>
+            </a:fontRef>
+          </p:style>
+        </p:cxnSp>
+        <p:sp>
+          <p:nvSpPr>
+            <p:cNvPr id="15" name="Rayo 14"/>
+            <p:cNvSpPr/>
+            <p:nvPr/>
+          </p:nvSpPr>
+          <p:spPr>
+            <a:xfrm flipH="1">
+              <a:off x="9410700" y="2762250"/>
+              <a:ext cx="1264920" cy="1196340"/>
+            </a:xfrm>
+            <a:prstGeom prst="lightningBolt">
+              <a:avLst/>
+            </a:prstGeom>
+            <a:noFill/>
+            <a:ln w="127000">
+              <a:solidFill>
+                <a:schemeClr val="tx1"/>
+              </a:solidFill>
+            </a:ln>
+          </p:spPr>
+          <p:style>
+            <a:lnRef idx="2">
+              <a:schemeClr val="accent1">
+                <a:shade val="50000"/>
+              </a:schemeClr>
+            </a:lnRef>
+            <a:fillRef idx="1">
+              <a:schemeClr val="accent1"/>
+            </a:fillRef>
+            <a:effectRef idx="0">
+              <a:schemeClr val="accent1"/>
+            </a:effectRef>
+            <a:fontRef idx="minor">
+              <a:schemeClr val="lt1"/>
+            </a:fontRef>
+          </p:style>
+          <p:txBody>
+            <a:bodyPr rtlCol="0" anchor="ctr"/>
+            <a:lstStyle/>
+            <a:p>
+              <a:pPr algn="ctr"/>
+              <a:endParaRPr lang="en-US"/>
+            </a:p>
+          </p:txBody>
+        </p:sp>
+      </p:grpSp>
     </p:spTree>
     <p:extLst>
       <p:ext uri="{BB962C8B-B14F-4D97-AF65-F5344CB8AC3E}">
@@ -4830,7 +5045,7 @@
   <a:objectDefaults>
     <a:lnDef>
       <a:spPr>
-        <a:ln w="76200"/>
+        <a:ln w="190500"/>
       </a:spPr>
       <a:bodyPr/>
       <a:lstStyle/>

</xml_diff>